<commit_message>
Update for new 10 D data
</commit_message>
<xml_diff>
--- a/presentation/Activelearning.pptx
+++ b/presentation/Activelearning.pptx
@@ -6115,11 +6115,6 @@
               </a:rPr>
               <a:t>Active Learning</a:t>
             </a:r>
-            <a:endParaRPr lang="en-US" altLang="zh-TW" sz="5400" b="1" dirty="0" smtClean="0">
-              <a:latin typeface="Arial" pitchFamily="34" charset="0"/>
-              <a:ea typeface="新細明體" pitchFamily="-106" charset="-120"/>
-              <a:cs typeface="Arial" pitchFamily="34" charset="0"/>
-            </a:endParaRPr>
           </a:p>
         </p:txBody>
       </p:sp>
@@ -6172,17 +6167,8 @@
               <a:rPr lang="en-US" altLang="zh-TW" dirty="0" smtClean="0">
                 <a:ea typeface="新細明體" pitchFamily="-106" charset="-120"/>
               </a:rPr>
-              <a:t>University of California, Los </a:t>
-            </a:r>
-            <a:r>
-              <a:rPr lang="en-US" altLang="zh-TW" dirty="0" smtClean="0">
-                <a:ea typeface="新細明體" pitchFamily="-106" charset="-120"/>
-              </a:rPr>
-              <a:t>Angeles</a:t>
-            </a:r>
-            <a:endParaRPr lang="en-US" altLang="zh-TW" dirty="0" smtClean="0">
-              <a:ea typeface="新細明體" pitchFamily="-106" charset="-120"/>
-            </a:endParaRPr>
+              <a:t>University of California, Los Angeles</a:t>
+            </a:r>
           </a:p>
         </p:txBody>
       </p:sp>
@@ -13477,9 +13463,19 @@
                 </a14:m>
                 <a:r>
                   <a:rPr lang="en-US" sz="2400" dirty="0" smtClean="0"/>
-                  <a:t> drawn at random from D</a:t>
+                  <a:t> drawn at random from </a:t>
                 </a:r>
-                <a:endParaRPr lang="en-US" sz="2400" dirty="0" smtClean="0"/>
+                <a14:m>
+                  <m:oMath xmlns:m="http://schemas.openxmlformats.org/officeDocument/2006/math">
+                    <m:r>
+                      <a:rPr lang="en-US" sz="2400" b="0" i="1" smtClean="0">
+                        <a:latin typeface="Cambria Math"/>
+                      </a:rPr>
+                      <m:t>𝐷</m:t>
+                    </m:r>
+                  </m:oMath>
+                </a14:m>
+                <a:endParaRPr lang="en-US" sz="2400" dirty="0"/>
               </a:p>
               <a:p>
                 <a:pPr lvl="1" eaLnBrk="1" hangingPunct="1">
@@ -13491,8 +13487,21 @@
                   <a:rPr lang="en-US" altLang="zh-TW" sz="2400" dirty="0" smtClean="0">
                     <a:ea typeface="新細明體" pitchFamily="-106" charset="-120"/>
                   </a:rPr>
-                  <a:t>Select “most informative” data to optimize expected gain</a:t>
+                  <a:t>Randomly select two committee members to predict </a:t>
                 </a:r>
+                <a14:m>
+                  <m:oMath xmlns:m="http://schemas.openxmlformats.org/officeDocument/2006/math">
+                    <m:r>
+                      <a:rPr lang="en-US" sz="2400" i="1">
+                        <a:latin typeface="Cambria Math"/>
+                      </a:rPr>
+                      <m:t>𝑥</m:t>
+                    </m:r>
+                  </m:oMath>
+                </a14:m>
+                <a:endParaRPr lang="en-US" altLang="zh-TW" sz="2400" dirty="0" smtClean="0">
+                  <a:ea typeface="新細明體" pitchFamily="-106" charset="-120"/>
+                </a:endParaRPr>
               </a:p>
               <a:p>
                 <a:pPr marL="344487" lvl="1" indent="0" eaLnBrk="1" hangingPunct="1">
@@ -13528,7 +13537,7 @@
               <a:blipFill rotWithShape="1">
                 <a:blip r:embed="rId2"/>
                 <a:stretch>
-                  <a:fillRect l="-354" t="-2065" r="-1062"/>
+                  <a:fillRect l="-354" t="-2065" r="-71"/>
                 </a:stretch>
               </a:blipFill>
               <a:ln>
@@ -13833,14 +13842,6 @@
               </a:rPr>
               <a:t>!</a:t>
             </a:r>
-            <a:endParaRPr lang="en-US" altLang="zh-TW" sz="6000" dirty="0" smtClean="0">
-              <a:solidFill>
-                <a:schemeClr val="accent6">
-                  <a:lumMod val="75000"/>
-                </a:schemeClr>
-              </a:solidFill>
-              <a:ea typeface="新細明體" pitchFamily="-106" charset="-120"/>
-            </a:endParaRPr>
           </a:p>
         </p:txBody>
       </p:sp>

</xml_diff>

<commit_message>
Smaller dataset and ppt
</commit_message>
<xml_diff>
--- a/presentation/Activelearning.pptx
+++ b/presentation/Activelearning.pptx
@@ -13435,7 +13435,11 @@
                 </a:pPr>
                 <a:r>
                   <a:rPr lang="en-US" sz="2400" dirty="0" smtClean="0"/>
-                  <a:t>Get an unlabeled example </a:t>
+                  <a:t>Step 1: Get </a:t>
+                </a:r>
+                <a:r>
+                  <a:rPr lang="en-US" sz="2400" dirty="0" smtClean="0"/>
+                  <a:t>an unlabeled example </a:t>
                 </a:r>
                 <a14:m>
                   <m:oMath xmlns:m="http://schemas.openxmlformats.org/officeDocument/2006/math">
@@ -13487,7 +13491,13 @@
                   <a:rPr lang="en-US" altLang="zh-TW" sz="2400" dirty="0" smtClean="0">
                     <a:ea typeface="新細明體" pitchFamily="-106" charset="-120"/>
                   </a:rPr>
-                  <a:t>Randomly select two committee members to predict </a:t>
+                  <a:t>Step 2: Randomly </a:t>
+                </a:r>
+                <a:r>
+                  <a:rPr lang="en-US" altLang="zh-TW" sz="2400" dirty="0" smtClean="0">
+                    <a:ea typeface="新細明體" pitchFamily="-106" charset="-120"/>
+                  </a:rPr>
+                  <a:t>select two committee members to predict </a:t>
                 </a:r>
                 <a14:m>
                   <m:oMath xmlns:m="http://schemas.openxmlformats.org/officeDocument/2006/math">
@@ -13499,6 +13509,193 @@
                     </m:r>
                   </m:oMath>
                 </a14:m>
+                <a:endParaRPr lang="en-US" altLang="zh-TW" sz="2400" dirty="0" smtClean="0">
+                  <a:ea typeface="新細明體" pitchFamily="-106" charset="-120"/>
+                </a:endParaRPr>
+              </a:p>
+              <a:p>
+                <a:pPr lvl="1" eaLnBrk="1" hangingPunct="1">
+                  <a:lnSpc>
+                    <a:spcPct val="90000"/>
+                  </a:lnSpc>
+                </a:pPr>
+                <a:r>
+                  <a:rPr lang="en-US" altLang="zh-TW" sz="2400" dirty="0" smtClean="0">
+                    <a:ea typeface="新細明體" pitchFamily="-106" charset="-120"/>
+                  </a:rPr>
+                  <a:t>Step 3: If the two predictions are equal then reject the example and return to Step1</a:t>
+                </a:r>
+              </a:p>
+              <a:p>
+                <a:pPr lvl="1" eaLnBrk="1" hangingPunct="1">
+                  <a:lnSpc>
+                    <a:spcPct val="90000"/>
+                  </a:lnSpc>
+                </a:pPr>
+                <a:r>
+                  <a:rPr lang="en-US" altLang="zh-TW" sz="2400" dirty="0" smtClean="0">
+                    <a:ea typeface="新細明體" pitchFamily="-106" charset="-120"/>
+                  </a:rPr>
+                  <a:t>Step 4: If the two predictions are different, get label </a:t>
+                </a:r>
+                <a14:m>
+                  <m:oMath xmlns:m="http://schemas.openxmlformats.org/officeDocument/2006/math">
+                    <m:r>
+                      <m:rPr>
+                        <m:sty m:val="p"/>
+                      </m:rPr>
+                      <a:rPr lang="en-US" sz="2400" b="0" i="0" smtClean="0">
+                        <a:latin typeface="Cambria Math"/>
+                      </a:rPr>
+                      <m:t>c</m:t>
+                    </m:r>
+                    <m:r>
+                      <a:rPr lang="en-US" sz="2400" b="0" i="0" smtClean="0">
+                        <a:latin typeface="Cambria Math"/>
+                      </a:rPr>
+                      <m:t>(</m:t>
+                    </m:r>
+                    <m:r>
+                      <a:rPr lang="en-US" sz="2400" i="1">
+                        <a:latin typeface="Cambria Math"/>
+                      </a:rPr>
+                      <m:t>𝑥</m:t>
+                    </m:r>
+                    <m:r>
+                      <a:rPr lang="en-US" sz="2400" b="0" i="1" smtClean="0">
+                        <a:latin typeface="Cambria Math"/>
+                      </a:rPr>
+                      <m:t>)</m:t>
+                    </m:r>
+                  </m:oMath>
+                </a14:m>
+                <a:r>
+                  <a:rPr lang="en-US" altLang="zh-TW" sz="2400" dirty="0" smtClean="0">
+                    <a:ea typeface="新細明體" pitchFamily="-106" charset="-120"/>
+                  </a:rPr>
+                  <a:t>, set </a:t>
+                </a:r>
+                <a14:m>
+                  <m:oMath xmlns:m="http://schemas.openxmlformats.org/officeDocument/2006/math">
+                    <m:sSub>
+                      <m:sSubPr>
+                        <m:ctrlPr>
+                          <a:rPr lang="en-US" sz="2400" b="0" i="1" smtClean="0">
+                            <a:latin typeface="Cambria Math"/>
+                          </a:rPr>
+                        </m:ctrlPr>
+                      </m:sSubPr>
+                      <m:e>
+                        <m:r>
+                          <a:rPr lang="en-US" sz="2400" b="0" i="1" smtClean="0">
+                            <a:latin typeface="Cambria Math"/>
+                          </a:rPr>
+                          <m:t>𝑉</m:t>
+                        </m:r>
+                      </m:e>
+                      <m:sub>
+                        <m:r>
+                          <a:rPr lang="en-US" sz="2400" b="0" i="1" smtClean="0">
+                            <a:latin typeface="Cambria Math"/>
+                          </a:rPr>
+                          <m:t>𝑛</m:t>
+                        </m:r>
+                      </m:sub>
+                    </m:sSub>
+                  </m:oMath>
+                </a14:m>
+                <a:r>
+                  <a:rPr lang="en-US" altLang="zh-TW" sz="2400" dirty="0" smtClean="0">
+                    <a:ea typeface="新細明體" pitchFamily="-106" charset="-120"/>
+                  </a:rPr>
+                  <a:t> to be all concepts </a:t>
+                </a:r>
+                <a14:m>
+                  <m:oMath xmlns:m="http://schemas.openxmlformats.org/officeDocument/2006/math">
+                    <m:sSup>
+                      <m:sSupPr>
+                        <m:ctrlPr>
+                          <a:rPr lang="en-US" sz="2400" b="0" i="0" smtClean="0">
+                            <a:latin typeface="Cambria Math"/>
+                          </a:rPr>
+                        </m:ctrlPr>
+                      </m:sSupPr>
+                      <m:e>
+                        <m:r>
+                          <m:rPr>
+                            <m:sty m:val="p"/>
+                          </m:rPr>
+                          <a:rPr lang="en-US" sz="2400" b="0" i="0" smtClean="0">
+                            <a:latin typeface="Cambria Math"/>
+                          </a:rPr>
+                          <m:t>c</m:t>
+                        </m:r>
+                      </m:e>
+                      <m:sup>
+                        <m:r>
+                          <a:rPr lang="en-US" sz="2400" b="0" i="0" smtClean="0">
+                            <a:latin typeface="Cambria Math"/>
+                          </a:rPr>
+                          <m:t>′</m:t>
+                        </m:r>
+                      </m:sup>
+                    </m:sSup>
+                    <m:r>
+                      <a:rPr lang="en-US" sz="2400">
+                        <a:latin typeface="Cambria Math"/>
+                        <a:ea typeface="Cambria Math"/>
+                      </a:rPr>
+                      <m:t>∈</m:t>
+                    </m:r>
+                    <m:sSub>
+                      <m:sSubPr>
+                        <m:ctrlPr>
+                          <a:rPr lang="en-US" sz="2400" i="1">
+                            <a:latin typeface="Cambria Math"/>
+                          </a:rPr>
+                        </m:ctrlPr>
+                      </m:sSubPr>
+                      <m:e>
+                        <m:r>
+                          <a:rPr lang="en-US" sz="2400" i="1">
+                            <a:latin typeface="Cambria Math"/>
+                          </a:rPr>
+                          <m:t>𝑉</m:t>
+                        </m:r>
+                      </m:e>
+                      <m:sub>
+                        <m:r>
+                          <a:rPr lang="en-US" sz="2400" i="1">
+                            <a:latin typeface="Cambria Math"/>
+                          </a:rPr>
+                          <m:t>𝑛</m:t>
+                        </m:r>
+                        <m:r>
+                          <a:rPr lang="en-US" sz="2400" b="0" i="1" smtClean="0">
+                            <a:latin typeface="Cambria Math"/>
+                          </a:rPr>
+                          <m:t>−1</m:t>
+                        </m:r>
+                      </m:sub>
+                    </m:sSub>
+                  </m:oMath>
+                </a14:m>
+                <a:r>
+                  <a:rPr lang="en-US" altLang="zh-TW" sz="2400" dirty="0" smtClean="0">
+                    <a:ea typeface="新細明體" pitchFamily="-106" charset="-120"/>
+                  </a:rPr>
+                  <a:t> such that </a:t>
+                </a:r>
+                <a:endParaRPr lang="en-US" altLang="zh-TW" sz="2400" dirty="0">
+                  <a:ea typeface="新細明體" pitchFamily="-106" charset="-120"/>
+                </a:endParaRPr>
+              </a:p>
+              <a:p>
+                <a:pPr lvl="1" eaLnBrk="1" hangingPunct="1">
+                  <a:lnSpc>
+                    <a:spcPct val="90000"/>
+                  </a:lnSpc>
+                </a:pPr>
                 <a:endParaRPr lang="en-US" altLang="zh-TW" sz="2400" dirty="0" smtClean="0">
                   <a:ea typeface="新細明體" pitchFamily="-106" charset="-120"/>
                 </a:endParaRPr>
@@ -13537,7 +13734,7 @@
               <a:blipFill rotWithShape="1">
                 <a:blip r:embed="rId2"/>
                 <a:stretch>
-                  <a:fillRect l="-354" t="-2065" r="-71"/>
+                  <a:fillRect l="-354" t="-2065" r="-283"/>
                 </a:stretch>
               </a:blipFill>
               <a:ln>

</xml_diff>